<commit_message>
Changes submitted after defense
</commit_message>
<xml_diff>
--- a/titleonly.pptx
+++ b/titleonly.pptx
@@ -6,6 +6,10 @@
   </p:sldMasterIdLst>
   <p:sldIdLst>
     <p:sldId id="256" r:id="rId2"/>
+    <p:sldId id="257" r:id="rId3"/>
+    <p:sldId id="258" r:id="rId4"/>
+    <p:sldId id="259" r:id="rId5"/>
+    <p:sldId id="260" r:id="rId6"/>
   </p:sldIdLst>
   <p:sldSz cx="9144000" cy="6858000" type="screen4x3"/>
   <p:notesSz cx="6858000" cy="9144000"/>
@@ -3569,6 +3573,1077 @@
 </p:sld>
 </file>
 
+<file path=ppt/slides/slide2.xml><?xml version="1.0" encoding="utf-8"?>
+<p:sld xmlns:a="http://schemas.openxmlformats.org/drawingml/2006/main" xmlns:r="http://schemas.openxmlformats.org/officeDocument/2006/relationships" xmlns:p="http://schemas.openxmlformats.org/presentationml/2006/main">
+  <p:cSld>
+    <p:spTree>
+      <p:nvGrpSpPr>
+        <p:cNvPr id="1" name=""/>
+        <p:cNvGrpSpPr/>
+        <p:nvPr/>
+      </p:nvGrpSpPr>
+      <p:grpSpPr>
+        <a:xfrm>
+          <a:off x="0" y="0"/>
+          <a:ext cx="0" cy="0"/>
+          <a:chOff x="0" y="0"/>
+          <a:chExt cx="0" cy="0"/>
+        </a:xfrm>
+      </p:grpSpPr>
+      <p:sp>
+        <p:nvSpPr>
+          <p:cNvPr id="2" name="Title 1"/>
+          <p:cNvSpPr>
+            <a:spLocks noGrp="1"/>
+          </p:cNvSpPr>
+          <p:nvPr>
+            <p:ph type="title"/>
+          </p:nvPr>
+        </p:nvSpPr>
+        <p:spPr/>
+        <p:txBody>
+          <a:bodyPr/>
+          <a:lstStyle/>
+          <a:p>
+            <a:r>
+              <a:rPr lang="en-US" dirty="0" smtClean="0"/>
+              <a:t>Contributions</a:t>
+            </a:r>
+            <a:endParaRPr lang="en-US" dirty="0"/>
+          </a:p>
+        </p:txBody>
+      </p:sp>
+      <p:sp>
+        <p:nvSpPr>
+          <p:cNvPr id="3" name="Content Placeholder 2"/>
+          <p:cNvSpPr>
+            <a:spLocks noGrp="1"/>
+          </p:cNvSpPr>
+          <p:nvPr>
+            <p:ph idx="1"/>
+          </p:nvPr>
+        </p:nvSpPr>
+        <p:spPr/>
+        <p:txBody>
+          <a:bodyPr>
+            <a:normAutofit fontScale="92500" lnSpcReduction="10000"/>
+          </a:bodyPr>
+          <a:lstStyle/>
+          <a:p>
+            <a:r>
+              <a:rPr lang="en-US" dirty="0" smtClean="0"/>
+              <a:t>Optimal state trajectory formulation [1]</a:t>
+            </a:r>
+            <a:endParaRPr lang="en-US" dirty="0" smtClean="0">
+              <a:solidFill>
+                <a:srgbClr val="00B050"/>
+              </a:solidFill>
+            </a:endParaRPr>
+          </a:p>
+          <a:p>
+            <a:r>
+              <a:rPr lang="en-US" dirty="0" smtClean="0"/>
+              <a:t>Considered transition costs [1]</a:t>
+            </a:r>
+          </a:p>
+          <a:p>
+            <a:r>
+              <a:rPr lang="en-US" dirty="0" smtClean="0"/>
+              <a:t>Evaluation of cost savings under various scenarios using real traces [1]</a:t>
+            </a:r>
+          </a:p>
+          <a:p>
+            <a:r>
+              <a:rPr lang="en-US" dirty="0" smtClean="0"/>
+              <a:t>Evaluated impact of prediction accuracy on savings [1]</a:t>
+            </a:r>
+          </a:p>
+          <a:p>
+            <a:endParaRPr lang="en-US" dirty="0"/>
+          </a:p>
+          <a:p>
+            <a:pPr marL="0" indent="0" algn="ctr">
+              <a:buNone/>
+            </a:pPr>
+            <a:r>
+              <a:rPr lang="en-US" dirty="0" smtClean="0">
+                <a:solidFill>
+                  <a:srgbClr val="00B050"/>
+                </a:solidFill>
+              </a:rPr>
+              <a:t>[1] “RED-BL</a:t>
+            </a:r>
+            <a:r>
+              <a:rPr lang="en-US" dirty="0">
+                <a:solidFill>
+                  <a:srgbClr val="00B050"/>
+                </a:solidFill>
+              </a:rPr>
+              <a:t>: Energy Solution for Loading Data </a:t>
+            </a:r>
+            <a:r>
+              <a:rPr lang="en-US" dirty="0" smtClean="0">
+                <a:solidFill>
+                  <a:srgbClr val="00B050"/>
+                </a:solidFill>
+              </a:rPr>
+              <a:t>Centers”, </a:t>
+            </a:r>
+            <a:r>
+              <a:rPr lang="en-US" dirty="0" err="1" smtClean="0">
+                <a:solidFill>
+                  <a:srgbClr val="00B050"/>
+                </a:solidFill>
+              </a:rPr>
+              <a:t>Infocom</a:t>
+            </a:r>
+            <a:r>
+              <a:rPr lang="en-US" dirty="0" smtClean="0">
+                <a:solidFill>
+                  <a:srgbClr val="00B050"/>
+                </a:solidFill>
+              </a:rPr>
+              <a:t> </a:t>
+            </a:r>
+            <a:r>
+              <a:rPr lang="en-US" dirty="0">
+                <a:solidFill>
+                  <a:srgbClr val="00B050"/>
+                </a:solidFill>
+              </a:rPr>
+              <a:t>2013 </a:t>
+            </a:r>
+            <a:r>
+              <a:rPr lang="en-US" dirty="0" smtClean="0">
+                <a:solidFill>
+                  <a:srgbClr val="00B050"/>
+                </a:solidFill>
+              </a:rPr>
+              <a:t>mini-conference</a:t>
+            </a:r>
+            <a:endParaRPr lang="en-US" dirty="0"/>
+          </a:p>
+        </p:txBody>
+      </p:sp>
+      <p:sp>
+        <p:nvSpPr>
+          <p:cNvPr id="4" name="Slide Number Placeholder 3"/>
+          <p:cNvSpPr>
+            <a:spLocks noGrp="1"/>
+          </p:cNvSpPr>
+          <p:nvPr>
+            <p:ph type="sldNum" sz="quarter" idx="12"/>
+          </p:nvPr>
+        </p:nvSpPr>
+        <p:spPr/>
+        <p:txBody>
+          <a:bodyPr/>
+          <a:lstStyle/>
+          <a:p>
+            <a:fld id="{6E32B92A-CB75-4E54-8293-CBC8A13B5AFB}" type="slidenum">
+              <a:rPr lang="en-US" smtClean="0"/>
+              <a:t>2</a:t>
+            </a:fld>
+            <a:endParaRPr lang="en-US"/>
+          </a:p>
+        </p:txBody>
+      </p:sp>
+    </p:spTree>
+    <p:extLst>
+      <p:ext uri="{BB962C8B-B14F-4D97-AF65-F5344CB8AC3E}">
+        <p14:creationId xmlns:p14="http://schemas.microsoft.com/office/powerpoint/2010/main" val="680051266"/>
+      </p:ext>
+    </p:extLst>
+  </p:cSld>
+  <p:clrMapOvr>
+    <a:masterClrMapping/>
+  </p:clrMapOvr>
+  <p:timing>
+    <p:tnLst>
+      <p:par>
+        <p:cTn id="1" dur="indefinite" restart="never" nodeType="tmRoot"/>
+      </p:par>
+    </p:tnLst>
+  </p:timing>
+</p:sld>
+</file>
+
+<file path=ppt/slides/slide3.xml><?xml version="1.0" encoding="utf-8"?>
+<p:sld xmlns:a="http://schemas.openxmlformats.org/drawingml/2006/main" xmlns:r="http://schemas.openxmlformats.org/officeDocument/2006/relationships" xmlns:p="http://schemas.openxmlformats.org/presentationml/2006/main">
+  <p:cSld>
+    <p:spTree>
+      <p:nvGrpSpPr>
+        <p:cNvPr id="1" name=""/>
+        <p:cNvGrpSpPr/>
+        <p:nvPr/>
+      </p:nvGrpSpPr>
+      <p:grpSpPr>
+        <a:xfrm>
+          <a:off x="0" y="0"/>
+          <a:ext cx="0" cy="0"/>
+          <a:chOff x="0" y="0"/>
+          <a:chExt cx="0" cy="0"/>
+        </a:xfrm>
+      </p:grpSpPr>
+      <p:sp>
+        <p:nvSpPr>
+          <p:cNvPr id="2" name="Title 1"/>
+          <p:cNvSpPr>
+            <a:spLocks noGrp="1"/>
+          </p:cNvSpPr>
+          <p:nvPr>
+            <p:ph type="title"/>
+          </p:nvPr>
+        </p:nvSpPr>
+        <p:spPr/>
+        <p:txBody>
+          <a:bodyPr/>
+          <a:lstStyle/>
+          <a:p>
+            <a:r>
+              <a:rPr lang="en-US" dirty="0" smtClean="0"/>
+              <a:t>Contributions</a:t>
+            </a:r>
+            <a:endParaRPr lang="en-US" dirty="0"/>
+          </a:p>
+        </p:txBody>
+      </p:sp>
+      <p:sp>
+        <p:nvSpPr>
+          <p:cNvPr id="3" name="Content Placeholder 2"/>
+          <p:cNvSpPr>
+            <a:spLocks noGrp="1"/>
+          </p:cNvSpPr>
+          <p:nvPr>
+            <p:ph idx="1"/>
+          </p:nvPr>
+        </p:nvSpPr>
+        <p:spPr/>
+        <p:txBody>
+          <a:bodyPr>
+            <a:normAutofit fontScale="92500" lnSpcReduction="20000"/>
+          </a:bodyPr>
+          <a:lstStyle/>
+          <a:p>
+            <a:r>
+              <a:rPr lang="en-US" dirty="0" smtClean="0"/>
+              <a:t>Evaluation of RED-BL with: </a:t>
+            </a:r>
+          </a:p>
+          <a:p>
+            <a:pPr lvl="1"/>
+            <a:r>
+              <a:rPr lang="en-US" dirty="0" smtClean="0"/>
+              <a:t>Partial data center shutdown [2]</a:t>
+            </a:r>
+          </a:p>
+          <a:p>
+            <a:pPr lvl="1"/>
+            <a:r>
+              <a:rPr lang="en-US" dirty="0" smtClean="0"/>
+              <a:t>Sleep modes [2]</a:t>
+            </a:r>
+          </a:p>
+          <a:p>
+            <a:r>
+              <a:rPr lang="en-US" dirty="0" smtClean="0"/>
+              <a:t>Sliding window re-optimization [2]</a:t>
+            </a:r>
+          </a:p>
+          <a:p>
+            <a:r>
+              <a:rPr lang="en-US" dirty="0" smtClean="0"/>
+              <a:t>Granular deactivation of data center equipment [2]</a:t>
+            </a:r>
+          </a:p>
+          <a:p>
+            <a:r>
+              <a:rPr lang="en-US" dirty="0" smtClean="0"/>
+              <a:t>Showed that RED-BL (for data centers) is the NP-Complete unit commit problem [2]</a:t>
+            </a:r>
+          </a:p>
+          <a:p>
+            <a:endParaRPr lang="en-US" dirty="0" smtClean="0"/>
+          </a:p>
+          <a:p>
+            <a:pPr marL="0" indent="0">
+              <a:buNone/>
+            </a:pPr>
+            <a:r>
+              <a:rPr lang="en-US" sz="2800" dirty="0" smtClean="0">
+                <a:solidFill>
+                  <a:srgbClr val="00B050"/>
+                </a:solidFill>
+              </a:rPr>
+              <a:t>[2] “RED-BL: Evaluating Dynamic Right Sizing for Data Center Networks”, Elsevier Computer Networks, 2014</a:t>
+            </a:r>
+            <a:endParaRPr lang="en-US" dirty="0">
+              <a:solidFill>
+                <a:srgbClr val="00B050"/>
+              </a:solidFill>
+            </a:endParaRPr>
+          </a:p>
+        </p:txBody>
+      </p:sp>
+      <p:sp>
+        <p:nvSpPr>
+          <p:cNvPr id="4" name="Slide Number Placeholder 3"/>
+          <p:cNvSpPr>
+            <a:spLocks noGrp="1"/>
+          </p:cNvSpPr>
+          <p:nvPr>
+            <p:ph type="sldNum" sz="quarter" idx="12"/>
+          </p:nvPr>
+        </p:nvSpPr>
+        <p:spPr/>
+        <p:txBody>
+          <a:bodyPr/>
+          <a:lstStyle/>
+          <a:p>
+            <a:fld id="{6E32B92A-CB75-4E54-8293-CBC8A13B5AFB}" type="slidenum">
+              <a:rPr lang="en-US" smtClean="0"/>
+              <a:t>3</a:t>
+            </a:fld>
+            <a:endParaRPr lang="en-US"/>
+          </a:p>
+        </p:txBody>
+      </p:sp>
+    </p:spTree>
+    <p:extLst>
+      <p:ext uri="{BB962C8B-B14F-4D97-AF65-F5344CB8AC3E}">
+        <p14:creationId xmlns:p14="http://schemas.microsoft.com/office/powerpoint/2010/main" val="85095831"/>
+      </p:ext>
+    </p:extLst>
+  </p:cSld>
+  <p:clrMapOvr>
+    <a:masterClrMapping/>
+  </p:clrMapOvr>
+  <p:timing>
+    <p:tnLst>
+      <p:par>
+        <p:cTn id="1" dur="indefinite" restart="never" nodeType="tmRoot"/>
+      </p:par>
+    </p:tnLst>
+  </p:timing>
+</p:sld>
+</file>
+
+<file path=ppt/slides/slide4.xml><?xml version="1.0" encoding="utf-8"?>
+<p:sld xmlns:a="http://schemas.openxmlformats.org/drawingml/2006/main" xmlns:r="http://schemas.openxmlformats.org/officeDocument/2006/relationships" xmlns:p="http://schemas.openxmlformats.org/presentationml/2006/main">
+  <p:cSld>
+    <p:spTree>
+      <p:nvGrpSpPr>
+        <p:cNvPr id="1" name=""/>
+        <p:cNvGrpSpPr/>
+        <p:nvPr/>
+      </p:nvGrpSpPr>
+      <p:grpSpPr>
+        <a:xfrm>
+          <a:off x="0" y="0"/>
+          <a:ext cx="0" cy="0"/>
+          <a:chOff x="0" y="0"/>
+          <a:chExt cx="0" cy="0"/>
+        </a:xfrm>
+      </p:grpSpPr>
+      <p:sp>
+        <p:nvSpPr>
+          <p:cNvPr id="2" name="Title 1"/>
+          <p:cNvSpPr>
+            <a:spLocks noGrp="1"/>
+          </p:cNvSpPr>
+          <p:nvPr>
+            <p:ph type="title"/>
+          </p:nvPr>
+        </p:nvSpPr>
+        <p:spPr/>
+        <p:txBody>
+          <a:bodyPr/>
+          <a:lstStyle/>
+          <a:p>
+            <a:r>
+              <a:rPr lang="en-US" dirty="0" smtClean="0"/>
+              <a:t>Contributions</a:t>
+            </a:r>
+            <a:endParaRPr lang="en-US" dirty="0"/>
+          </a:p>
+        </p:txBody>
+      </p:sp>
+      <p:sp>
+        <p:nvSpPr>
+          <p:cNvPr id="3" name="Content Placeholder 2"/>
+          <p:cNvSpPr>
+            <a:spLocks noGrp="1"/>
+          </p:cNvSpPr>
+          <p:nvPr>
+            <p:ph idx="1"/>
+          </p:nvPr>
+        </p:nvSpPr>
+        <p:spPr/>
+        <p:txBody>
+          <a:bodyPr>
+            <a:normAutofit fontScale="85000" lnSpcReduction="20000"/>
+          </a:bodyPr>
+          <a:lstStyle/>
+          <a:p>
+            <a:r>
+              <a:rPr lang="en-US" dirty="0" smtClean="0"/>
+              <a:t>Application of state trajectory optimization to cellular networks [2, 3]</a:t>
+            </a:r>
+          </a:p>
+          <a:p>
+            <a:r>
+              <a:rPr lang="en-US" dirty="0" smtClean="0"/>
+              <a:t>Showed that RED-BL for cellular networks is NP-Hard [4]</a:t>
+            </a:r>
+          </a:p>
+          <a:p>
+            <a:r>
+              <a:rPr lang="en-US" dirty="0" smtClean="0"/>
+              <a:t>Evaluated RED-BL using traces from a live network [3, 4]</a:t>
+            </a:r>
+          </a:p>
+          <a:p>
+            <a:endParaRPr lang="en-US" dirty="0" smtClean="0"/>
+          </a:p>
+          <a:p>
+            <a:pPr marL="0" indent="0">
+              <a:buNone/>
+            </a:pPr>
+            <a:r>
+              <a:rPr lang="en-US" dirty="0" smtClean="0">
+                <a:solidFill>
+                  <a:srgbClr val="00B050"/>
+                </a:solidFill>
+              </a:rPr>
+              <a:t>[3] “Electricity Cost Efficient Workload Mapping”, IEEE INFOCOM 2013 Computer Communications Workshop</a:t>
+            </a:r>
+          </a:p>
+          <a:p>
+            <a:pPr marL="0" indent="0">
+              <a:buNone/>
+            </a:pPr>
+            <a:r>
+              <a:rPr lang="en-US" dirty="0" smtClean="0">
+                <a:solidFill>
+                  <a:srgbClr val="00B050"/>
+                </a:solidFill>
+              </a:rPr>
+              <a:t>[4] “Low-Carb: Reducing Energy Consumption in Operational Cellular Networks” IEEE GLOBECOM 2013</a:t>
+            </a:r>
+          </a:p>
+          <a:p>
+            <a:pPr marL="0" indent="0">
+              <a:buNone/>
+            </a:pPr>
+            <a:endParaRPr lang="en-US" dirty="0"/>
+          </a:p>
+        </p:txBody>
+      </p:sp>
+      <p:sp>
+        <p:nvSpPr>
+          <p:cNvPr id="4" name="Slide Number Placeholder 3"/>
+          <p:cNvSpPr>
+            <a:spLocks noGrp="1"/>
+          </p:cNvSpPr>
+          <p:nvPr>
+            <p:ph type="sldNum" sz="quarter" idx="12"/>
+          </p:nvPr>
+        </p:nvSpPr>
+        <p:spPr/>
+        <p:txBody>
+          <a:bodyPr/>
+          <a:lstStyle/>
+          <a:p>
+            <a:fld id="{6E32B92A-CB75-4E54-8293-CBC8A13B5AFB}" type="slidenum">
+              <a:rPr lang="en-US" smtClean="0"/>
+              <a:t>4</a:t>
+            </a:fld>
+            <a:endParaRPr lang="en-US"/>
+          </a:p>
+        </p:txBody>
+      </p:sp>
+    </p:spTree>
+    <p:extLst>
+      <p:ext uri="{BB962C8B-B14F-4D97-AF65-F5344CB8AC3E}">
+        <p14:creationId xmlns:p14="http://schemas.microsoft.com/office/powerpoint/2010/main" val="1765684030"/>
+      </p:ext>
+    </p:extLst>
+  </p:cSld>
+  <p:clrMapOvr>
+    <a:masterClrMapping/>
+  </p:clrMapOvr>
+  <p:timing>
+    <p:tnLst>
+      <p:par>
+        <p:cTn id="1" dur="indefinite" restart="never" nodeType="tmRoot"/>
+      </p:par>
+    </p:tnLst>
+  </p:timing>
+</p:sld>
+</file>
+
+<file path=ppt/slides/slide5.xml><?xml version="1.0" encoding="utf-8"?>
+<p:sld xmlns:a="http://schemas.openxmlformats.org/drawingml/2006/main" xmlns:r="http://schemas.openxmlformats.org/officeDocument/2006/relationships" xmlns:p="http://schemas.openxmlformats.org/presentationml/2006/main">
+  <p:cSld>
+    <p:spTree>
+      <p:nvGrpSpPr>
+        <p:cNvPr id="1" name=""/>
+        <p:cNvGrpSpPr/>
+        <p:nvPr/>
+      </p:nvGrpSpPr>
+      <p:grpSpPr>
+        <a:xfrm>
+          <a:off x="0" y="0"/>
+          <a:ext cx="0" cy="0"/>
+          <a:chOff x="0" y="0"/>
+          <a:chExt cx="0" cy="0"/>
+        </a:xfrm>
+      </p:grpSpPr>
+      <p:sp>
+        <p:nvSpPr>
+          <p:cNvPr id="2" name="Title 1"/>
+          <p:cNvSpPr>
+            <a:spLocks noGrp="1"/>
+          </p:cNvSpPr>
+          <p:nvPr>
+            <p:ph type="title"/>
+          </p:nvPr>
+        </p:nvSpPr>
+        <p:spPr/>
+        <p:txBody>
+          <a:bodyPr/>
+          <a:lstStyle/>
+          <a:p>
+            <a:endParaRPr lang="en-US"/>
+          </a:p>
+        </p:txBody>
+      </p:sp>
+      <mc:AlternateContent xmlns:mc="http://schemas.openxmlformats.org/markup-compatibility/2006">
+        <mc:Choice xmlns:a14="http://schemas.microsoft.com/office/drawing/2010/main" Requires="a14">
+          <p:sp>
+            <p:nvSpPr>
+              <p:cNvPr id="3" name="Content Placeholder 2"/>
+              <p:cNvSpPr>
+                <a:spLocks noGrp="1"/>
+              </p:cNvSpPr>
+              <p:nvPr>
+                <p:ph idx="1"/>
+              </p:nvPr>
+            </p:nvSpPr>
+            <p:spPr/>
+            <p:txBody>
+              <a:bodyPr>
+                <a:normAutofit fontScale="70000" lnSpcReduction="20000"/>
+              </a:bodyPr>
+              <a:lstStyle/>
+              <a:p>
+                <a14:m>
+                  <m:oMath xmlns:m="http://schemas.openxmlformats.org/officeDocument/2006/math">
+                    <m:r>
+                      <a:rPr lang="en-US" b="0" i="1" smtClean="0">
+                        <a:latin typeface="Cambria Math"/>
+                      </a:rPr>
+                      <m:t>𝑚𝑖𝑛𝑖𝑚𝑖𝑧𝑒</m:t>
+                    </m:r>
+                    <m:r>
+                      <a:rPr lang="en-US" b="0" i="1" smtClean="0">
+                        <a:latin typeface="Cambria Math"/>
+                      </a:rPr>
+                      <m:t> </m:t>
+                    </m:r>
+                    <m:nary>
+                      <m:naryPr>
+                        <m:chr m:val="∑"/>
+                        <m:ctrlPr>
+                          <a:rPr lang="en-US" b="0" i="1" smtClean="0">
+                            <a:latin typeface="Cambria Math"/>
+                          </a:rPr>
+                        </m:ctrlPr>
+                      </m:naryPr>
+                      <m:sub>
+                        <m:r>
+                          <m:rPr>
+                            <m:brk m:alnAt="23"/>
+                          </m:rPr>
+                          <a:rPr lang="en-US" b="0" i="1" smtClean="0">
+                            <a:latin typeface="Cambria Math"/>
+                          </a:rPr>
+                          <m:t>𝑗</m:t>
+                        </m:r>
+                        <m:r>
+                          <a:rPr lang="en-US" b="0" i="1" smtClean="0">
+                            <a:latin typeface="Cambria Math"/>
+                          </a:rPr>
+                          <m:t>=1</m:t>
+                        </m:r>
+                      </m:sub>
+                      <m:sup>
+                        <m:r>
+                          <a:rPr lang="en-US" b="0" i="1" smtClean="0">
+                            <a:latin typeface="Cambria Math"/>
+                          </a:rPr>
+                          <m:t>𝑛</m:t>
+                        </m:r>
+                      </m:sup>
+                      <m:e>
+                        <m:nary>
+                          <m:naryPr>
+                            <m:chr m:val="∑"/>
+                            <m:ctrlPr>
+                              <a:rPr lang="en-US" b="0" i="1" smtClean="0">
+                                <a:latin typeface="Cambria Math"/>
+                              </a:rPr>
+                            </m:ctrlPr>
+                          </m:naryPr>
+                          <m:sub>
+                            <m:r>
+                              <m:rPr>
+                                <m:brk m:alnAt="23"/>
+                              </m:rPr>
+                              <a:rPr lang="en-US" b="0" i="1" smtClean="0">
+                                <a:latin typeface="Cambria Math"/>
+                              </a:rPr>
+                              <m:t>𝑖</m:t>
+                            </m:r>
+                            <m:r>
+                              <a:rPr lang="en-US" b="0" i="1" smtClean="0">
+                                <a:latin typeface="Cambria Math"/>
+                              </a:rPr>
+                              <m:t>=1</m:t>
+                            </m:r>
+                          </m:sub>
+                          <m:sup>
+                            <m:r>
+                              <a:rPr lang="en-US" b="0" i="1" smtClean="0">
+                                <a:latin typeface="Cambria Math"/>
+                              </a:rPr>
+                              <m:t>𝑚</m:t>
+                            </m:r>
+                          </m:sup>
+                          <m:e>
+                            <m:sSub>
+                              <m:sSubPr>
+                                <m:ctrlPr>
+                                  <a:rPr lang="en-US" b="0" i="1" smtClean="0">
+                                    <a:latin typeface="Cambria Math"/>
+                                  </a:rPr>
+                                </m:ctrlPr>
+                              </m:sSubPr>
+                              <m:e>
+                                <m:r>
+                                  <a:rPr lang="en-US" b="0" i="1" smtClean="0">
+                                    <a:latin typeface="Cambria Math"/>
+                                  </a:rPr>
+                                  <m:t>𝑐</m:t>
+                                </m:r>
+                              </m:e>
+                              <m:sub>
+                                <m:r>
+                                  <a:rPr lang="en-US" b="0" i="1" smtClean="0">
+                                    <a:latin typeface="Cambria Math"/>
+                                  </a:rPr>
+                                  <m:t>𝑖</m:t>
+                                </m:r>
+                              </m:sub>
+                            </m:sSub>
+                            <m:sSub>
+                              <m:sSubPr>
+                                <m:ctrlPr>
+                                  <a:rPr lang="en-US" b="0" i="1" smtClean="0">
+                                    <a:latin typeface="Cambria Math"/>
+                                  </a:rPr>
+                                </m:ctrlPr>
+                              </m:sSubPr>
+                              <m:e>
+                                <m:r>
+                                  <a:rPr lang="en-US" b="0" i="1" smtClean="0">
+                                    <a:latin typeface="Cambria Math"/>
+                                  </a:rPr>
+                                  <m:t>𝑒</m:t>
+                                </m:r>
+                              </m:e>
+                              <m:sub>
+                                <m:r>
+                                  <a:rPr lang="en-US" b="0" i="1" smtClean="0">
+                                    <a:latin typeface="Cambria Math"/>
+                                  </a:rPr>
+                                  <m:t>𝑖</m:t>
+                                </m:r>
+                                <m:r>
+                                  <a:rPr lang="en-US" b="0" i="1" smtClean="0">
+                                    <a:latin typeface="Cambria Math"/>
+                                  </a:rPr>
+                                  <m:t>,</m:t>
+                                </m:r>
+                                <m:r>
+                                  <a:rPr lang="en-US" b="0" i="1" smtClean="0">
+                                    <a:latin typeface="Cambria Math"/>
+                                  </a:rPr>
+                                  <m:t>𝑗</m:t>
+                                </m:r>
+                              </m:sub>
+                            </m:sSub>
+                            <m:d>
+                              <m:dPr>
+                                <m:ctrlPr>
+                                  <a:rPr lang="en-US" b="0" i="1" smtClean="0">
+                                    <a:latin typeface="Cambria Math"/>
+                                  </a:rPr>
+                                </m:ctrlPr>
+                              </m:dPr>
+                              <m:e>
+                                <m:sSub>
+                                  <m:sSubPr>
+                                    <m:ctrlPr>
+                                      <a:rPr lang="en-US" b="0" i="1" smtClean="0">
+                                        <a:latin typeface="Cambria Math"/>
+                                      </a:rPr>
+                                    </m:ctrlPr>
+                                  </m:sSubPr>
+                                  <m:e>
+                                    <m:r>
+                                      <a:rPr lang="en-US" b="0" i="1" smtClean="0">
+                                        <a:latin typeface="Cambria Math"/>
+                                      </a:rPr>
+                                      <m:t>𝑝</m:t>
+                                    </m:r>
+                                  </m:e>
+                                  <m:sub>
+                                    <m:r>
+                                      <a:rPr lang="en-US" b="0" i="1" smtClean="0">
+                                        <a:latin typeface="Cambria Math"/>
+                                      </a:rPr>
+                                      <m:t>𝑖</m:t>
+                                    </m:r>
+                                    <m:r>
+                                      <a:rPr lang="en-US" b="0" i="1" smtClean="0">
+                                        <a:latin typeface="Cambria Math"/>
+                                      </a:rPr>
+                                      <m:t>,</m:t>
+                                    </m:r>
+                                    <m:r>
+                                      <a:rPr lang="en-US" b="0" i="1" smtClean="0">
+                                        <a:latin typeface="Cambria Math"/>
+                                      </a:rPr>
+                                      <m:t>𝑗</m:t>
+                                    </m:r>
+                                  </m:sub>
+                                </m:sSub>
+                                <m:r>
+                                  <a:rPr lang="en-US" b="0" i="1" smtClean="0">
+                                    <a:latin typeface="Cambria Math"/>
+                                    <a:ea typeface="Cambria Math"/>
+                                  </a:rPr>
+                                  <m:t>𝜆</m:t>
+                                </m:r>
+                                <m:d>
+                                  <m:dPr>
+                                    <m:ctrlPr>
+                                      <a:rPr lang="en-US" b="0" i="1" smtClean="0">
+                                        <a:latin typeface="Cambria Math"/>
+                                        <a:ea typeface="Cambria Math"/>
+                                      </a:rPr>
+                                    </m:ctrlPr>
+                                  </m:dPr>
+                                  <m:e>
+                                    <m:r>
+                                      <a:rPr lang="en-US" b="0" i="1" smtClean="0">
+                                        <a:latin typeface="Cambria Math"/>
+                                        <a:ea typeface="Cambria Math"/>
+                                      </a:rPr>
+                                      <m:t>𝑓</m:t>
+                                    </m:r>
+                                    <m:r>
+                                      <a:rPr lang="en-US" b="0" i="1" smtClean="0">
+                                        <a:latin typeface="Cambria Math"/>
+                                        <a:ea typeface="Cambria Math"/>
+                                      </a:rPr>
+                                      <m:t>+</m:t>
+                                    </m:r>
+                                    <m:d>
+                                      <m:dPr>
+                                        <m:ctrlPr>
+                                          <a:rPr lang="en-US" b="0" i="1" smtClean="0">
+                                            <a:latin typeface="Cambria Math"/>
+                                            <a:ea typeface="Cambria Math"/>
+                                          </a:rPr>
+                                        </m:ctrlPr>
+                                      </m:dPr>
+                                      <m:e>
+                                        <m:r>
+                                          <a:rPr lang="en-US" b="0" i="1" smtClean="0">
+                                            <a:latin typeface="Cambria Math"/>
+                                            <a:ea typeface="Cambria Math"/>
+                                          </a:rPr>
+                                          <m:t>1−</m:t>
+                                        </m:r>
+                                        <m:r>
+                                          <a:rPr lang="en-US" b="0" i="1" smtClean="0">
+                                            <a:latin typeface="Cambria Math"/>
+                                            <a:ea typeface="Cambria Math"/>
+                                          </a:rPr>
+                                          <m:t>𝑓</m:t>
+                                        </m:r>
+                                      </m:e>
+                                    </m:d>
+                                    <m:f>
+                                      <m:fPr>
+                                        <m:ctrlPr>
+                                          <a:rPr lang="en-US" b="0" i="1" smtClean="0">
+                                            <a:latin typeface="Cambria Math"/>
+                                            <a:ea typeface="Cambria Math"/>
+                                          </a:rPr>
+                                        </m:ctrlPr>
+                                      </m:fPr>
+                                      <m:num>
+                                        <m:sSub>
+                                          <m:sSubPr>
+                                            <m:ctrlPr>
+                                              <a:rPr lang="en-US" i="1">
+                                                <a:latin typeface="Cambria Math"/>
+                                                <a:ea typeface="Cambria Math"/>
+                                              </a:rPr>
+                                            </m:ctrlPr>
+                                          </m:sSubPr>
+                                          <m:e>
+                                            <m:r>
+                                              <a:rPr lang="en-US" i="1">
+                                                <a:latin typeface="Cambria Math"/>
+                                                <a:ea typeface="Cambria Math"/>
+                                              </a:rPr>
+                                              <m:t>𝑥</m:t>
+                                            </m:r>
+                                          </m:e>
+                                          <m:sub>
+                                            <m:r>
+                                              <a:rPr lang="en-US" i="1">
+                                                <a:latin typeface="Cambria Math"/>
+                                                <a:ea typeface="Cambria Math"/>
+                                              </a:rPr>
+                                              <m:t>𝑖</m:t>
+                                            </m:r>
+                                            <m:r>
+                                              <a:rPr lang="en-US" i="1">
+                                                <a:latin typeface="Cambria Math"/>
+                                                <a:ea typeface="Cambria Math"/>
+                                              </a:rPr>
+                                              <m:t>,</m:t>
+                                            </m:r>
+                                            <m:r>
+                                              <a:rPr lang="en-US" i="1">
+                                                <a:latin typeface="Cambria Math"/>
+                                                <a:ea typeface="Cambria Math"/>
+                                              </a:rPr>
+                                              <m:t>𝑗</m:t>
+                                            </m:r>
+                                          </m:sub>
+                                        </m:sSub>
+                                      </m:num>
+                                      <m:den>
+                                        <m:sSub>
+                                          <m:sSubPr>
+                                            <m:ctrlPr>
+                                              <a:rPr lang="en-US" b="0" i="1" smtClean="0">
+                                                <a:latin typeface="Cambria Math"/>
+                                                <a:ea typeface="Cambria Math"/>
+                                              </a:rPr>
+                                            </m:ctrlPr>
+                                          </m:sSubPr>
+                                          <m:e>
+                                            <m:r>
+                                              <a:rPr lang="en-US" b="0" i="1" smtClean="0">
+                                                <a:latin typeface="Cambria Math"/>
+                                                <a:ea typeface="Cambria Math"/>
+                                              </a:rPr>
+                                              <m:t>𝑐</m:t>
+                                            </m:r>
+                                          </m:e>
+                                          <m:sub>
+                                            <m:r>
+                                              <a:rPr lang="en-US" b="0" i="1" smtClean="0">
+                                                <a:latin typeface="Cambria Math"/>
+                                                <a:ea typeface="Cambria Math"/>
+                                              </a:rPr>
+                                              <m:t>𝑖</m:t>
+                                            </m:r>
+                                          </m:sub>
+                                        </m:sSub>
+                                      </m:den>
+                                    </m:f>
+                                  </m:e>
+                                </m:d>
+                                <m:r>
+                                  <a:rPr lang="en-US" b="0" i="1" smtClean="0">
+                                    <a:latin typeface="Cambria Math"/>
+                                    <a:ea typeface="Cambria Math"/>
+                                  </a:rPr>
+                                  <m:t>+</m:t>
+                                </m:r>
+                                <m:sSub>
+                                  <m:sSubPr>
+                                    <m:ctrlPr>
+                                      <a:rPr lang="en-US" b="0" i="1" smtClean="0">
+                                        <a:latin typeface="Cambria Math"/>
+                                        <a:ea typeface="Cambria Math"/>
+                                      </a:rPr>
+                                    </m:ctrlPr>
+                                  </m:sSubPr>
+                                  <m:e>
+                                    <m:r>
+                                      <a:rPr lang="en-US" b="0" i="1" smtClean="0">
+                                        <a:latin typeface="Cambria Math"/>
+                                        <a:ea typeface="Cambria Math"/>
+                                      </a:rPr>
+                                      <m:t>𝑏</m:t>
+                                    </m:r>
+                                  </m:e>
+                                  <m:sub>
+                                    <m:r>
+                                      <a:rPr lang="en-US" b="0" i="1" smtClean="0">
+                                        <a:latin typeface="Cambria Math"/>
+                                        <a:ea typeface="Cambria Math"/>
+                                      </a:rPr>
+                                      <m:t>𝑖</m:t>
+                                    </m:r>
+                                    <m:r>
+                                      <a:rPr lang="en-US" b="0" i="1" smtClean="0">
+                                        <a:latin typeface="Cambria Math"/>
+                                        <a:ea typeface="Cambria Math"/>
+                                      </a:rPr>
+                                      <m:t>,</m:t>
+                                    </m:r>
+                                    <m:r>
+                                      <a:rPr lang="en-US" b="0" i="1" smtClean="0">
+                                        <a:latin typeface="Cambria Math"/>
+                                        <a:ea typeface="Cambria Math"/>
+                                      </a:rPr>
+                                      <m:t>𝑗</m:t>
+                                    </m:r>
+                                  </m:sub>
+                                </m:sSub>
+                                <m:r>
+                                  <a:rPr lang="en-US" b="0" i="1" smtClean="0">
+                                    <a:latin typeface="Cambria Math"/>
+                                    <a:ea typeface="Cambria Math"/>
+                                  </a:rPr>
+                                  <m:t>𝜎</m:t>
+                                </m:r>
+                                <m:r>
+                                  <a:rPr lang="en-US" b="0" i="1" smtClean="0">
+                                    <a:latin typeface="Cambria Math"/>
+                                    <a:ea typeface="Cambria Math"/>
+                                  </a:rPr>
+                                  <m:t>+</m:t>
+                                </m:r>
+                                <m:sSub>
+                                  <m:sSubPr>
+                                    <m:ctrlPr>
+                                      <a:rPr lang="en-US" b="0" i="1" smtClean="0">
+                                        <a:latin typeface="Cambria Math"/>
+                                        <a:ea typeface="Cambria Math"/>
+                                      </a:rPr>
+                                    </m:ctrlPr>
+                                  </m:sSubPr>
+                                  <m:e>
+                                    <m:r>
+                                      <a:rPr lang="en-US" b="0" i="1" smtClean="0">
+                                        <a:latin typeface="Cambria Math"/>
+                                        <a:ea typeface="Cambria Math"/>
+                                      </a:rPr>
+                                      <m:t>𝑠</m:t>
+                                    </m:r>
+                                  </m:e>
+                                  <m:sub>
+                                    <m:r>
+                                      <a:rPr lang="en-US" b="0" i="1" smtClean="0">
+                                        <a:latin typeface="Cambria Math"/>
+                                        <a:ea typeface="Cambria Math"/>
+                                      </a:rPr>
+                                      <m:t>𝑖</m:t>
+                                    </m:r>
+                                    <m:r>
+                                      <a:rPr lang="en-US" b="0" i="1" smtClean="0">
+                                        <a:latin typeface="Cambria Math"/>
+                                        <a:ea typeface="Cambria Math"/>
+                                      </a:rPr>
+                                      <m:t>,</m:t>
+                                    </m:r>
+                                    <m:r>
+                                      <a:rPr lang="en-US" b="0" i="1" smtClean="0">
+                                        <a:latin typeface="Cambria Math"/>
+                                        <a:ea typeface="Cambria Math"/>
+                                      </a:rPr>
+                                      <m:t>𝑗</m:t>
+                                    </m:r>
+                                  </m:sub>
+                                </m:sSub>
+                                <m:r>
+                                  <a:rPr lang="en-US" b="0" i="1" smtClean="0">
+                                    <a:latin typeface="Cambria Math"/>
+                                    <a:ea typeface="Cambria Math"/>
+                                  </a:rPr>
+                                  <m:t>𝛿</m:t>
+                                </m:r>
+                              </m:e>
+                            </m:d>
+                          </m:e>
+                        </m:nary>
+                      </m:e>
+                    </m:nary>
+                  </m:oMath>
+                </a14:m>
+                <a:endParaRPr lang="en-US" dirty="0"/>
+              </a:p>
+            </p:txBody>
+          </p:sp>
+        </mc:Choice>
+        <mc:Fallback>
+          <p:sp>
+            <p:nvSpPr>
+              <p:cNvPr id="3" name="Content Placeholder 2"/>
+              <p:cNvSpPr>
+                <a:spLocks noGrp="1" noRot="1" noChangeAspect="1" noMove="1" noResize="1" noEditPoints="1" noAdjustHandles="1" noChangeArrowheads="1" noChangeShapeType="1" noTextEdit="1"/>
+              </p:cNvSpPr>
+              <p:nvPr>
+                <p:ph idx="1"/>
+              </p:nvPr>
+            </p:nvSpPr>
+            <p:spPr>
+              <a:blipFill rotWithShape="1">
+                <a:blip r:embed="rId2"/>
+                <a:stretch>
+                  <a:fillRect/>
+                </a:stretch>
+              </a:blipFill>
+            </p:spPr>
+            <p:txBody>
+              <a:bodyPr/>
+              <a:lstStyle/>
+              <a:p>
+                <a:r>
+                  <a:rPr lang="en-US">
+                    <a:noFill/>
+                  </a:rPr>
+                  <a:t> </a:t>
+                </a:r>
+              </a:p>
+            </p:txBody>
+          </p:sp>
+        </mc:Fallback>
+      </mc:AlternateContent>
+    </p:spTree>
+    <p:extLst>
+      <p:ext uri="{BB962C8B-B14F-4D97-AF65-F5344CB8AC3E}">
+        <p14:creationId xmlns:p14="http://schemas.microsoft.com/office/powerpoint/2010/main" val="465401249"/>
+      </p:ext>
+    </p:extLst>
+  </p:cSld>
+  <p:clrMapOvr>
+    <a:masterClrMapping/>
+  </p:clrMapOvr>
+</p:sld>
+</file>
+
 <file path=ppt/theme/theme1.xml><?xml version="1.0" encoding="utf-8"?>
 <a:theme xmlns:a="http://schemas.openxmlformats.org/drawingml/2006/main" name="Office Theme">
   <a:themeElements>

</xml_diff>